<commit_message>
DeveloperGuide.adoc: Updated sequence diagrams
</commit_message>
<xml_diff>
--- a/docs/diagrams/Command_Manage_SequenceDiagram.pptx
+++ b/docs/diagrams/Command_Manage_SequenceDiagram.pptx
@@ -208,7 +208,7 @@
           <a:p>
             <a:fld id="{F5CC4B3F-88C1-4FFA-B1B6-F41C21DC6924}" type="datetimeFigureOut">
               <a:rPr lang="en-US" smtClean="0"/>
-              <a:t>10/16/2018</a:t>
+              <a:t>10/31/2018</a:t>
             </a:fld>
             <a:endParaRPr lang="en-US"/>
           </a:p>
@@ -475,6 +475,90 @@
 </p:notesMaster>
 </file>
 
+<file path=ppt/notesSlides/notesSlide1.xml><?xml version="1.0" encoding="utf-8"?>
+<p:notes xmlns:a="http://schemas.openxmlformats.org/drawingml/2006/main" xmlns:r="http://schemas.openxmlformats.org/officeDocument/2006/relationships" xmlns:p="http://schemas.openxmlformats.org/presentationml/2006/main">
+  <p:cSld>
+    <p:spTree>
+      <p:nvGrpSpPr>
+        <p:cNvPr id="1" name=""/>
+        <p:cNvGrpSpPr/>
+        <p:nvPr/>
+      </p:nvGrpSpPr>
+      <p:grpSpPr>
+        <a:xfrm>
+          <a:off x="0" y="0"/>
+          <a:ext cx="0" cy="0"/>
+          <a:chOff x="0" y="0"/>
+          <a:chExt cx="0" cy="0"/>
+        </a:xfrm>
+      </p:grpSpPr>
+      <p:sp>
+        <p:nvSpPr>
+          <p:cNvPr id="2" name="Slide Image Placeholder 1"/>
+          <p:cNvSpPr>
+            <a:spLocks noGrp="1" noRot="1" noChangeAspect="1"/>
+          </p:cNvSpPr>
+          <p:nvPr>
+            <p:ph type="sldImg"/>
+          </p:nvPr>
+        </p:nvSpPr>
+        <p:spPr/>
+      </p:sp>
+      <p:sp>
+        <p:nvSpPr>
+          <p:cNvPr id="3" name="Notes Placeholder 2"/>
+          <p:cNvSpPr>
+            <a:spLocks noGrp="1"/>
+          </p:cNvSpPr>
+          <p:nvPr>
+            <p:ph type="body" idx="1"/>
+          </p:nvPr>
+        </p:nvSpPr>
+        <p:spPr/>
+        <p:txBody>
+          <a:bodyPr/>
+          <a:lstStyle/>
+          <a:p>
+            <a:endParaRPr lang="en-SG" dirty="0"/>
+          </a:p>
+        </p:txBody>
+      </p:sp>
+      <p:sp>
+        <p:nvSpPr>
+          <p:cNvPr id="4" name="Slide Number Placeholder 3"/>
+          <p:cNvSpPr>
+            <a:spLocks noGrp="1"/>
+          </p:cNvSpPr>
+          <p:nvPr>
+            <p:ph type="sldNum" sz="quarter" idx="5"/>
+          </p:nvPr>
+        </p:nvSpPr>
+        <p:spPr/>
+        <p:txBody>
+          <a:bodyPr/>
+          <a:lstStyle/>
+          <a:p>
+            <a:fld id="{5A7AB025-77E3-4BD1-A2FD-B3183DBA47A3}" type="slidenum">
+              <a:rPr lang="en-US" smtClean="0"/>
+              <a:t>1</a:t>
+            </a:fld>
+            <a:endParaRPr lang="en-US"/>
+          </a:p>
+        </p:txBody>
+      </p:sp>
+    </p:spTree>
+    <p:extLst>
+      <p:ext uri="{BB962C8B-B14F-4D97-AF65-F5344CB8AC3E}">
+        <p14:creationId xmlns:p14="http://schemas.microsoft.com/office/powerpoint/2010/main" val="3181425191"/>
+      </p:ext>
+    </p:extLst>
+  </p:cSld>
+  <p:clrMapOvr>
+    <a:masterClrMapping/>
+  </p:clrMapOvr>
+</p:notes>
+</file>
+
 <file path=ppt/slideLayouts/slideLayout1.xml><?xml version="1.0" encoding="utf-8"?>
 <p:sldLayout xmlns:a="http://schemas.openxmlformats.org/drawingml/2006/main" xmlns:r="http://schemas.openxmlformats.org/officeDocument/2006/relationships" xmlns:p="http://schemas.openxmlformats.org/presentationml/2006/main" type="title" preserve="1">
   <p:cSld name="Title Slide">
@@ -654,7 +738,7 @@
           <a:p>
             <a:fld id="{78C97017-6FC3-485B-9764-EAC9E56C1D49}" type="datetimeFigureOut">
               <a:rPr lang="en-US" smtClean="0"/>
-              <a:t>10/16/2018</a:t>
+              <a:t>10/31/2018</a:t>
             </a:fld>
             <a:endParaRPr lang="en-US"/>
           </a:p>
@@ -822,7 +906,7 @@
           <a:p>
             <a:fld id="{78C97017-6FC3-485B-9764-EAC9E56C1D49}" type="datetimeFigureOut">
               <a:rPr lang="en-US" smtClean="0"/>
-              <a:t>10/16/2018</a:t>
+              <a:t>10/31/2018</a:t>
             </a:fld>
             <a:endParaRPr lang="en-US"/>
           </a:p>
@@ -1000,7 +1084,7 @@
           <a:p>
             <a:fld id="{78C97017-6FC3-485B-9764-EAC9E56C1D49}" type="datetimeFigureOut">
               <a:rPr lang="en-US" smtClean="0"/>
-              <a:t>10/16/2018</a:t>
+              <a:t>10/31/2018</a:t>
             </a:fld>
             <a:endParaRPr lang="en-US"/>
           </a:p>
@@ -1168,7 +1252,7 @@
           <a:p>
             <a:fld id="{78C97017-6FC3-485B-9764-EAC9E56C1D49}" type="datetimeFigureOut">
               <a:rPr lang="en-US" smtClean="0"/>
-              <a:t>10/16/2018</a:t>
+              <a:t>10/31/2018</a:t>
             </a:fld>
             <a:endParaRPr lang="en-US"/>
           </a:p>
@@ -1413,7 +1497,7 @@
           <a:p>
             <a:fld id="{78C97017-6FC3-485B-9764-EAC9E56C1D49}" type="datetimeFigureOut">
               <a:rPr lang="en-US" smtClean="0"/>
-              <a:t>10/16/2018</a:t>
+              <a:t>10/31/2018</a:t>
             </a:fld>
             <a:endParaRPr lang="en-US"/>
           </a:p>
@@ -1698,7 +1782,7 @@
           <a:p>
             <a:fld id="{78C97017-6FC3-485B-9764-EAC9E56C1D49}" type="datetimeFigureOut">
               <a:rPr lang="en-US" smtClean="0"/>
-              <a:t>10/16/2018</a:t>
+              <a:t>10/31/2018</a:t>
             </a:fld>
             <a:endParaRPr lang="en-US"/>
           </a:p>
@@ -2117,7 +2201,7 @@
           <a:p>
             <a:fld id="{78C97017-6FC3-485B-9764-EAC9E56C1D49}" type="datetimeFigureOut">
               <a:rPr lang="en-US" smtClean="0"/>
-              <a:t>10/16/2018</a:t>
+              <a:t>10/31/2018</a:t>
             </a:fld>
             <a:endParaRPr lang="en-US"/>
           </a:p>
@@ -2234,7 +2318,7 @@
           <a:p>
             <a:fld id="{78C97017-6FC3-485B-9764-EAC9E56C1D49}" type="datetimeFigureOut">
               <a:rPr lang="en-US" smtClean="0"/>
-              <a:t>10/16/2018</a:t>
+              <a:t>10/31/2018</a:t>
             </a:fld>
             <a:endParaRPr lang="en-US"/>
           </a:p>
@@ -2329,7 +2413,7 @@
           <a:p>
             <a:fld id="{78C97017-6FC3-485B-9764-EAC9E56C1D49}" type="datetimeFigureOut">
               <a:rPr lang="en-US" smtClean="0"/>
-              <a:t>10/16/2018</a:t>
+              <a:t>10/31/2018</a:t>
             </a:fld>
             <a:endParaRPr lang="en-US"/>
           </a:p>
@@ -2604,7 +2688,7 @@
           <a:p>
             <a:fld id="{78C97017-6FC3-485B-9764-EAC9E56C1D49}" type="datetimeFigureOut">
               <a:rPr lang="en-US" smtClean="0"/>
-              <a:t>10/16/2018</a:t>
+              <a:t>10/31/2018</a:t>
             </a:fld>
             <a:endParaRPr lang="en-US"/>
           </a:p>
@@ -2856,7 +2940,7 @@
           <a:p>
             <a:fld id="{78C97017-6FC3-485B-9764-EAC9E56C1D49}" type="datetimeFigureOut">
               <a:rPr lang="en-US" smtClean="0"/>
-              <a:t>10/16/2018</a:t>
+              <a:t>10/31/2018</a:t>
             </a:fld>
             <a:endParaRPr lang="en-US"/>
           </a:p>
@@ -3067,7 +3151,7 @@
           <a:p>
             <a:fld id="{78C97017-6FC3-485B-9764-EAC9E56C1D49}" type="datetimeFigureOut">
               <a:rPr lang="en-US" smtClean="0"/>
-              <a:t>10/16/2018</a:t>
+              <a:t>10/31/2018</a:t>
             </a:fld>
             <a:endParaRPr lang="en-US"/>
           </a:p>
@@ -3450,8 +3534,8 @@
         </p:nvSpPr>
         <p:spPr>
           <a:xfrm>
-            <a:off x="-1504840" y="709489"/>
-            <a:ext cx="9315619" cy="4343400"/>
+            <a:off x="-2190640" y="797685"/>
+            <a:ext cx="10335831" cy="5056133"/>
           </a:xfrm>
           <a:prstGeom prst="roundRect">
             <a:avLst>
@@ -3514,13 +3598,14 @@
           </p:cNvPr>
           <p:cNvCxnSpPr>
             <a:cxnSpLocks/>
+            <a:endCxn id="73" idx="0"/>
           </p:cNvCxnSpPr>
           <p:nvPr/>
         </p:nvCxnSpPr>
         <p:spPr>
-          <a:xfrm>
-            <a:off x="6690416" y="2415140"/>
-            <a:ext cx="0" cy="2416653"/>
+          <a:xfrm flipH="1">
+            <a:off x="7073735" y="3055485"/>
+            <a:ext cx="8870" cy="2340453"/>
           </a:xfrm>
           <a:prstGeom prst="line">
             <a:avLst/>
@@ -3556,8 +3641,8 @@
         </p:nvSpPr>
         <p:spPr>
           <a:xfrm>
-            <a:off x="8153402" y="685800"/>
-            <a:ext cx="3886198" cy="4400926"/>
+            <a:off x="8305800" y="785840"/>
+            <a:ext cx="3516031" cy="5079821"/>
           </a:xfrm>
           <a:prstGeom prst="roundRect">
             <a:avLst>
@@ -3617,7 +3702,7 @@
         </p:nvSpPr>
         <p:spPr>
           <a:xfrm>
-            <a:off x="-1129354" y="1117528"/>
+            <a:off x="-1815154" y="1205725"/>
             <a:ext cx="1455629" cy="346760"/>
           </a:xfrm>
           <a:prstGeom prst="rect">
@@ -3677,9 +3762,9 @@
           <p:nvPr/>
         </p:nvCxnSpPr>
         <p:spPr>
-          <a:xfrm>
-            <a:off x="-401541" y="1481201"/>
-            <a:ext cx="0" cy="3481399"/>
+          <a:xfrm flipH="1">
+            <a:off x="-1099679" y="1569398"/>
+            <a:ext cx="12338" cy="4088150"/>
           </a:xfrm>
           <a:prstGeom prst="line">
             <a:avLst/>
@@ -3715,8 +3800,8 @@
         </p:nvSpPr>
         <p:spPr>
           <a:xfrm>
-            <a:off x="-473549" y="1831895"/>
-            <a:ext cx="119340" cy="2999896"/>
+            <a:off x="-1159350" y="1920092"/>
+            <a:ext cx="134811" cy="3475846"/>
           </a:xfrm>
           <a:prstGeom prst="rect">
             <a:avLst/>
@@ -3762,7 +3847,7 @@
         </p:nvSpPr>
         <p:spPr>
           <a:xfrm>
-            <a:off x="1424688" y="996604"/>
+            <a:off x="738888" y="1084801"/>
             <a:ext cx="1219200" cy="467684"/>
           </a:xfrm>
           <a:prstGeom prst="rect">
@@ -3833,9 +3918,9 @@
           <p:nvPr/>
         </p:nvCxnSpPr>
         <p:spPr>
-          <a:xfrm>
-            <a:off x="2038087" y="1481199"/>
-            <a:ext cx="0" cy="1482984"/>
+          <a:xfrm flipH="1">
+            <a:off x="1332532" y="1569396"/>
+            <a:ext cx="19756" cy="1791898"/>
           </a:xfrm>
           <a:prstGeom prst="line">
             <a:avLst/>
@@ -3871,8 +3956,8 @@
         </p:nvSpPr>
         <p:spPr>
           <a:xfrm>
-            <a:off x="1966080" y="1939392"/>
-            <a:ext cx="154408" cy="767790"/>
+            <a:off x="1280280" y="2027588"/>
+            <a:ext cx="149399" cy="1126462"/>
           </a:xfrm>
           <a:prstGeom prst="rect">
             <a:avLst/>
@@ -3916,14 +4001,13 @@
           <p:cNvCxnSpPr>
             <a:cxnSpLocks/>
             <a:stCxn id="21" idx="0"/>
-            <a:endCxn id="4" idx="0"/>
           </p:cNvCxnSpPr>
           <p:nvPr/>
         </p:nvCxnSpPr>
         <p:spPr>
-          <a:xfrm flipH="1">
-            <a:off x="3850540" y="2187215"/>
-            <a:ext cx="1604" cy="2644578"/>
+          <a:xfrm>
+            <a:off x="4255705" y="2275412"/>
+            <a:ext cx="18529" cy="1085882"/>
           </a:xfrm>
           <a:prstGeom prst="line">
             <a:avLst/>
@@ -3959,8 +4043,8 @@
         </p:nvSpPr>
         <p:spPr>
           <a:xfrm>
-            <a:off x="3774949" y="2187215"/>
-            <a:ext cx="154393" cy="766746"/>
+            <a:off x="4174700" y="2275412"/>
+            <a:ext cx="162009" cy="776968"/>
           </a:xfrm>
           <a:prstGeom prst="rect">
             <a:avLst/>
@@ -4006,7 +4090,7 @@
         </p:nvCxnSpPr>
         <p:spPr>
           <a:xfrm>
-            <a:off x="-1593399" y="1835581"/>
+            <a:off x="-2279199" y="1923778"/>
             <a:ext cx="1119851" cy="0"/>
           </a:xfrm>
           <a:prstGeom prst="straightConnector1">
@@ -4042,7 +4126,7 @@
         </p:nvSpPr>
         <p:spPr>
           <a:xfrm>
-            <a:off x="-2286000" y="1564182"/>
+            <a:off x="-2971800" y="1652379"/>
             <a:ext cx="1736448" cy="215444"/>
           </a:xfrm>
           <a:prstGeom prst="rect">
@@ -4078,8 +4162,8 @@
         </p:nvCxnSpPr>
         <p:spPr>
           <a:xfrm>
-            <a:off x="2123474" y="2085925"/>
-            <a:ext cx="935911" cy="1612"/>
+            <a:off x="1437674" y="2174122"/>
+            <a:ext cx="1991326" cy="14400"/>
           </a:xfrm>
           <a:prstGeom prst="straightConnector1">
             <a:avLst/>
@@ -4114,7 +4198,7 @@
         </p:nvSpPr>
         <p:spPr>
           <a:xfrm>
-            <a:off x="1230923" y="3057653"/>
+            <a:off x="304800" y="3289756"/>
             <a:ext cx="855809" cy="215444"/>
           </a:xfrm>
           <a:prstGeom prst="rect">
@@ -4156,8 +4240,8 @@
         </p:nvCxnSpPr>
         <p:spPr>
           <a:xfrm>
-            <a:off x="3960209" y="4664014"/>
-            <a:ext cx="2558034" cy="1"/>
+            <a:off x="-990053" y="5174923"/>
+            <a:ext cx="7959656" cy="6756"/>
           </a:xfrm>
           <a:prstGeom prst="straightConnector1">
             <a:avLst/>
@@ -4196,7 +4280,7 @@
         </p:nvCxnSpPr>
         <p:spPr>
           <a:xfrm>
-            <a:off x="-321147" y="2707182"/>
+            <a:off x="-1036510" y="3154050"/>
             <a:ext cx="2348067" cy="0"/>
           </a:xfrm>
           <a:prstGeom prst="straightConnector1">
@@ -4234,7 +4318,7 @@
         </p:nvCxnSpPr>
         <p:spPr>
           <a:xfrm>
-            <a:off x="-1631500" y="4764582"/>
+            <a:off x="-2358532" y="5316031"/>
             <a:ext cx="1196051" cy="0"/>
           </a:xfrm>
           <a:prstGeom prst="straightConnector1">
@@ -4272,8 +4356,8 @@
         </p:nvSpPr>
         <p:spPr>
           <a:xfrm>
-            <a:off x="3774946" y="3304897"/>
-            <a:ext cx="192356" cy="1445274"/>
+            <a:off x="6970535" y="3428999"/>
+            <a:ext cx="191333" cy="1821760"/>
           </a:xfrm>
           <a:prstGeom prst="rect">
             <a:avLst/>
@@ -4319,7 +4403,7 @@
         </p:nvSpPr>
         <p:spPr>
           <a:xfrm>
-            <a:off x="-290644" y="1690257"/>
+            <a:off x="-976444" y="1778454"/>
             <a:ext cx="2288001" cy="215444"/>
           </a:xfrm>
           <a:prstGeom prst="rect">
@@ -4357,14 +4441,14 @@
       </p:sp>
       <p:sp>
         <p:nvSpPr>
-          <p:cNvPr id="82" name="TextBox 81"/>
+          <p:cNvPr id="83" name="TextBox 82"/>
           <p:cNvSpPr txBox="1"/>
           <p:nvPr/>
         </p:nvSpPr>
         <p:spPr>
           <a:xfrm>
-            <a:off x="1279494" y="4444558"/>
-            <a:ext cx="621216" cy="215444"/>
+            <a:off x="-2297752" y="5023829"/>
+            <a:ext cx="762000" cy="215444"/>
           </a:xfrm>
           <a:prstGeom prst="rect">
             <a:avLst/>
@@ -4397,53 +4481,13 @@
       </p:sp>
       <p:sp>
         <p:nvSpPr>
-          <p:cNvPr id="83" name="TextBox 82"/>
-          <p:cNvSpPr txBox="1"/>
-          <p:nvPr/>
-        </p:nvSpPr>
-        <p:spPr>
-          <a:xfrm>
-            <a:off x="-1570720" y="4472380"/>
-            <a:ext cx="762000" cy="215444"/>
-          </a:xfrm>
-          <a:prstGeom prst="rect">
-            <a:avLst/>
-          </a:prstGeom>
-          <a:noFill/>
-        </p:spPr>
-        <p:txBody>
-          <a:bodyPr wrap="square" lIns="0" tIns="0" rIns="0" bIns="0" rtlCol="0">
-            <a:spAutoFit/>
-          </a:bodyPr>
-          <a:lstStyle>
-            <a:defPPr>
-              <a:defRPr lang="en-US"/>
-            </a:defPPr>
-            <a:lvl1pPr algn="r">
-              <a:defRPr sz="1400">
-                <a:solidFill>
-                  <a:srgbClr val="0070C0"/>
-                </a:solidFill>
-              </a:defRPr>
-            </a:lvl1pPr>
-          </a:lstStyle>
-          <a:p>
-            <a:r>
-              <a:rPr lang="en-US" dirty="0"/>
-              <a:t>result</a:t>
-            </a:r>
-          </a:p>
-        </p:txBody>
-      </p:sp>
-      <p:sp>
-        <p:nvSpPr>
           <p:cNvPr id="40" name="Rectangle 62"/>
           <p:cNvSpPr/>
           <p:nvPr/>
         </p:nvSpPr>
         <p:spPr>
           <a:xfrm>
-            <a:off x="8534400" y="2318115"/>
+            <a:off x="8683364" y="2406312"/>
             <a:ext cx="841636" cy="300180"/>
           </a:xfrm>
           <a:prstGeom prst="rect">
@@ -4504,8 +4548,8 @@
         </p:nvCxnSpPr>
         <p:spPr>
           <a:xfrm>
-            <a:off x="8970739" y="2645409"/>
-            <a:ext cx="16486" cy="2186384"/>
+            <a:off x="9137717" y="2733606"/>
+            <a:ext cx="6283" cy="2820033"/>
           </a:xfrm>
           <a:prstGeom prst="line">
             <a:avLst/>
@@ -4538,13 +4582,12 @@
           <p:cNvPr id="50" name="Straight Arrow Connector 49"/>
           <p:cNvCxnSpPr>
             <a:cxnSpLocks/>
-            <a:endCxn id="51" idx="1"/>
           </p:cNvCxnSpPr>
           <p:nvPr/>
         </p:nvCxnSpPr>
         <p:spPr>
           <a:xfrm>
-            <a:off x="3850540" y="2452478"/>
+            <a:off x="4250292" y="2667000"/>
             <a:ext cx="1995613" cy="0"/>
           </a:xfrm>
           <a:prstGeom prst="straightConnector1">
@@ -4580,7 +4623,7 @@
         </p:nvSpPr>
         <p:spPr>
           <a:xfrm>
-            <a:off x="3721338" y="4831793"/>
+            <a:off x="4141160" y="3284296"/>
             <a:ext cx="258404" cy="261610"/>
           </a:xfrm>
           <a:prstGeom prst="rect">
@@ -4613,7 +4656,7 @@
         </p:nvSpPr>
         <p:spPr>
           <a:xfrm>
-            <a:off x="3029248" y="1751090"/>
+            <a:off x="3429000" y="1839287"/>
             <a:ext cx="1570026" cy="461538"/>
           </a:xfrm>
           <a:prstGeom prst="rect">
@@ -4691,8 +4734,8 @@
         </p:nvCxnSpPr>
         <p:spPr>
           <a:xfrm>
-            <a:off x="-245554" y="3366569"/>
-            <a:ext cx="3835943" cy="14401"/>
+            <a:off x="-1016543" y="3509317"/>
+            <a:ext cx="7945342" cy="2676"/>
           </a:xfrm>
           <a:prstGeom prst="straightConnector1">
             <a:avLst/>
@@ -4735,7 +4778,7 @@
         </p:nvCxnSpPr>
         <p:spPr>
           <a:xfrm>
-            <a:off x="-304253" y="1937502"/>
+            <a:off x="-990053" y="2025699"/>
             <a:ext cx="2256705" cy="1"/>
           </a:xfrm>
           <a:prstGeom prst="straightConnector1">
@@ -4763,90 +4806,6 @@
           </a:fontRef>
         </p:style>
       </p:cxnSp>
-      <p:cxnSp>
-        <p:nvCxnSpPr>
-          <p:cNvPr id="69" name="Straight Arrow Connector 68">
-            <a:extLst>
-              <a:ext uri="{FF2B5EF4-FFF2-40B4-BE49-F238E27FC236}">
-                <a16:creationId xmlns:a16="http://schemas.microsoft.com/office/drawing/2014/main" id="{7C9F21BC-13A9-471F-825A-2621FD36355F}"/>
-              </a:ext>
-            </a:extLst>
-          </p:cNvPr>
-          <p:cNvCxnSpPr>
-            <a:cxnSpLocks/>
-          </p:cNvCxnSpPr>
-          <p:nvPr/>
-        </p:nvCxnSpPr>
-        <p:spPr>
-          <a:xfrm>
-            <a:off x="-198099" y="4747575"/>
-            <a:ext cx="3831517" cy="0"/>
-          </a:xfrm>
-          <a:prstGeom prst="straightConnector1">
-            <a:avLst/>
-          </a:prstGeom>
-          <a:ln w="19050">
-            <a:solidFill>
-              <a:srgbClr val="0070C0"/>
-            </a:solidFill>
-            <a:prstDash val="sysDash"/>
-            <a:headEnd type="arrow" w="med" len="med"/>
-            <a:tailEnd type="none" w="med" len="med"/>
-          </a:ln>
-        </p:spPr>
-        <p:style>
-          <a:lnRef idx="1">
-            <a:schemeClr val="accent1"/>
-          </a:lnRef>
-          <a:fillRef idx="0">
-            <a:schemeClr val="accent1"/>
-          </a:fillRef>
-          <a:effectRef idx="0">
-            <a:schemeClr val="accent1"/>
-          </a:effectRef>
-          <a:fontRef idx="minor">
-            <a:schemeClr val="tx1"/>
-          </a:fontRef>
-        </p:style>
-      </p:cxnSp>
-      <p:cxnSp>
-        <p:nvCxnSpPr>
-          <p:cNvPr id="52" name="Straight Arrow Connector 51"/>
-          <p:cNvCxnSpPr>
-            <a:cxnSpLocks/>
-          </p:cNvCxnSpPr>
-          <p:nvPr/>
-        </p:nvCxnSpPr>
-        <p:spPr>
-          <a:xfrm>
-            <a:off x="6783793" y="3129995"/>
-            <a:ext cx="2071861" cy="0"/>
-          </a:xfrm>
-          <a:prstGeom prst="straightConnector1">
-            <a:avLst/>
-          </a:prstGeom>
-          <a:ln w="19050">
-            <a:solidFill>
-              <a:srgbClr val="7030A0"/>
-            </a:solidFill>
-            <a:tailEnd type="arrow"/>
-          </a:ln>
-        </p:spPr>
-        <p:style>
-          <a:lnRef idx="1">
-            <a:schemeClr val="accent1"/>
-          </a:lnRef>
-          <a:fillRef idx="0">
-            <a:schemeClr val="accent1"/>
-          </a:fillRef>
-          <a:effectRef idx="0">
-            <a:schemeClr val="accent1"/>
-          </a:effectRef>
-          <a:fontRef idx="minor">
-            <a:schemeClr val="tx1"/>
-          </a:fontRef>
-        </p:style>
-      </p:cxnSp>
       <p:sp>
         <p:nvSpPr>
           <p:cNvPr id="47" name="TextBox 46">
@@ -4861,8 +4820,8 @@
         </p:nvSpPr>
         <p:spPr>
           <a:xfrm>
-            <a:off x="2071556" y="1835477"/>
-            <a:ext cx="875325" cy="215444"/>
+            <a:off x="1447800" y="1918156"/>
+            <a:ext cx="1920052" cy="215444"/>
           </a:xfrm>
           <a:prstGeom prst="rect">
             <a:avLst/>
@@ -4887,8 +4846,12 @@
           </a:lstStyle>
           <a:p>
             <a:r>
+              <a:rPr lang="en-US" dirty="0" err="1"/>
+              <a:t>ManageCommandParser</a:t>
+            </a:r>
+            <a:r>
               <a:rPr lang="en-US" dirty="0"/>
-              <a:t>parse(“1”)</a:t>
+              <a:t>()</a:t>
             </a:r>
           </a:p>
         </p:txBody>
@@ -4907,7 +4870,7 @@
         </p:nvSpPr>
         <p:spPr>
           <a:xfrm>
-            <a:off x="5846153" y="2221709"/>
+            <a:off x="6228009" y="2362200"/>
             <a:ext cx="1772991" cy="461538"/>
           </a:xfrm>
           <a:prstGeom prst="rect">
@@ -4980,8 +4943,8 @@
         </p:nvSpPr>
         <p:spPr>
           <a:xfrm>
-            <a:off x="4048820" y="2209800"/>
-            <a:ext cx="1756536" cy="215444"/>
+            <a:off x="4191000" y="2416915"/>
+            <a:ext cx="1888060" cy="215444"/>
           </a:xfrm>
           <a:prstGeom prst="rect">
             <a:avLst/>
@@ -5011,7 +4974,7 @@
             </a:r>
             <a:r>
               <a:rPr lang="en-US" dirty="0"/>
-              <a:t>(“1”)</a:t>
+              <a:t>()</a:t>
             </a:r>
           </a:p>
         </p:txBody>
@@ -5030,8 +4993,8 @@
         </p:nvSpPr>
         <p:spPr>
           <a:xfrm>
-            <a:off x="6629400" y="2645407"/>
-            <a:ext cx="129305" cy="2037923"/>
+            <a:off x="6973366" y="2819401"/>
+            <a:ext cx="179907" cy="184666"/>
           </a:xfrm>
           <a:prstGeom prst="rect">
             <a:avLst/>
@@ -5071,10 +5034,270 @@
       </p:sp>
       <p:sp>
         <p:nvSpPr>
-          <p:cNvPr id="71" name="TextBox 70">
+          <p:cNvPr id="85" name="Rectangle 84">
             <a:extLst>
               <a:ext uri="{FF2B5EF4-FFF2-40B4-BE49-F238E27FC236}">
-                <a16:creationId xmlns:a16="http://schemas.microsoft.com/office/drawing/2014/main" id="{AE54E49B-BF66-4DA8-A939-98ED8F49A676}"/>
+                <a16:creationId xmlns:a16="http://schemas.microsoft.com/office/drawing/2014/main" id="{3AFEEBFE-32B8-45E5-952F-30F9106A9F10}"/>
+              </a:ext>
+            </a:extLst>
+          </p:cNvPr>
+          <p:cNvSpPr/>
+          <p:nvPr/>
+        </p:nvSpPr>
+        <p:spPr>
+          <a:xfrm>
+            <a:off x="8988356" y="3581400"/>
+            <a:ext cx="231844" cy="1617377"/>
+          </a:xfrm>
+          <a:prstGeom prst="rect">
+            <a:avLst/>
+          </a:prstGeom>
+          <a:solidFill>
+            <a:srgbClr val="7030A0"/>
+          </a:solidFill>
+          <a:ln>
+            <a:solidFill>
+              <a:srgbClr val="7030A0"/>
+            </a:solidFill>
+          </a:ln>
+          <a:effectLst/>
+        </p:spPr>
+        <p:style>
+          <a:lnRef idx="1">
+            <a:schemeClr val="accent3"/>
+          </a:lnRef>
+          <a:fillRef idx="2">
+            <a:schemeClr val="accent3"/>
+          </a:fillRef>
+          <a:effectRef idx="1">
+            <a:schemeClr val="accent3"/>
+          </a:effectRef>
+          <a:fontRef idx="minor">
+            <a:schemeClr val="dk1"/>
+          </a:fontRef>
+        </p:style>
+        <p:txBody>
+          <a:bodyPr rtlCol="0" anchor="ctr"/>
+          <a:lstStyle/>
+          <a:p>
+            <a:pPr algn="ctr"/>
+            <a:endParaRPr lang="en-SG" sz="1400"/>
+          </a:p>
+        </p:txBody>
+      </p:sp>
+      <p:sp>
+        <p:nvSpPr>
+          <p:cNvPr id="41" name="Rectangle 62">
+            <a:extLst>
+              <a:ext uri="{FF2B5EF4-FFF2-40B4-BE49-F238E27FC236}">
+                <a16:creationId xmlns:a16="http://schemas.microsoft.com/office/drawing/2014/main" id="{B78A3FC8-6CAF-49AD-A43C-FFC02BAE2D9C}"/>
+              </a:ext>
+            </a:extLst>
+          </p:cNvPr>
+          <p:cNvSpPr/>
+          <p:nvPr/>
+        </p:nvSpPr>
+        <p:spPr>
+          <a:xfrm>
+            <a:off x="10439400" y="2406312"/>
+            <a:ext cx="996792" cy="300180"/>
+          </a:xfrm>
+          <a:prstGeom prst="rect">
+            <a:avLst/>
+          </a:prstGeom>
+          <a:solidFill>
+            <a:srgbClr val="7030A0"/>
+          </a:solidFill>
+          <a:ln w="19050">
+            <a:solidFill>
+              <a:srgbClr val="7030A0"/>
+            </a:solidFill>
+          </a:ln>
+          <a:effectLst/>
+        </p:spPr>
+        <p:style>
+          <a:lnRef idx="1">
+            <a:schemeClr val="accent2"/>
+          </a:lnRef>
+          <a:fillRef idx="2">
+            <a:schemeClr val="accent2"/>
+          </a:fillRef>
+          <a:effectRef idx="1">
+            <a:schemeClr val="accent2"/>
+          </a:effectRef>
+          <a:fontRef idx="minor">
+            <a:schemeClr val="dk1"/>
+          </a:fontRef>
+        </p:style>
+        <p:txBody>
+          <a:bodyPr rtlCol="0" anchor="ctr"/>
+          <a:lstStyle/>
+          <a:p>
+            <a:pPr algn="ctr"/>
+            <a:r>
+              <a:rPr lang="en-US" sz="1600" dirty="0">
+                <a:solidFill>
+                  <a:schemeClr val="bg1"/>
+                </a:solidFill>
+              </a:rPr>
+              <a:t>: Context</a:t>
+            </a:r>
+            <a:endParaRPr lang="en-SG" sz="1600" dirty="0">
+              <a:solidFill>
+                <a:schemeClr val="bg1"/>
+              </a:solidFill>
+            </a:endParaRPr>
+          </a:p>
+        </p:txBody>
+      </p:sp>
+      <p:cxnSp>
+        <p:nvCxnSpPr>
+          <p:cNvPr id="45" name="Straight Connector 44">
+            <a:extLst>
+              <a:ext uri="{FF2B5EF4-FFF2-40B4-BE49-F238E27FC236}">
+                <a16:creationId xmlns:a16="http://schemas.microsoft.com/office/drawing/2014/main" id="{CFD98A32-7C4C-4E96-8F24-54B792BF6158}"/>
+              </a:ext>
+            </a:extLst>
+          </p:cNvPr>
+          <p:cNvCxnSpPr>
+            <a:cxnSpLocks/>
+          </p:cNvCxnSpPr>
+          <p:nvPr/>
+        </p:nvCxnSpPr>
+        <p:spPr>
+          <a:xfrm>
+            <a:off x="10995446" y="2446258"/>
+            <a:ext cx="6283" cy="2604539"/>
+          </a:xfrm>
+          <a:prstGeom prst="line">
+            <a:avLst/>
+          </a:prstGeom>
+          <a:ln w="19050">
+            <a:solidFill>
+              <a:srgbClr val="7030A0"/>
+            </a:solidFill>
+            <a:prstDash val="sysDash"/>
+          </a:ln>
+          <a:effectLst/>
+        </p:spPr>
+        <p:style>
+          <a:lnRef idx="1">
+            <a:schemeClr val="accent1"/>
+          </a:lnRef>
+          <a:fillRef idx="2">
+            <a:schemeClr val="accent1"/>
+          </a:fillRef>
+          <a:effectRef idx="1">
+            <a:schemeClr val="accent1"/>
+          </a:effectRef>
+          <a:fontRef idx="minor">
+            <a:schemeClr val="dk1"/>
+          </a:fontRef>
+        </p:style>
+      </p:cxnSp>
+      <p:sp>
+        <p:nvSpPr>
+          <p:cNvPr id="48" name="Rectangle 47">
+            <a:extLst>
+              <a:ext uri="{FF2B5EF4-FFF2-40B4-BE49-F238E27FC236}">
+                <a16:creationId xmlns:a16="http://schemas.microsoft.com/office/drawing/2014/main" id="{A837F9B3-2EF2-40A4-B6F1-80480B194316}"/>
+              </a:ext>
+            </a:extLst>
+          </p:cNvPr>
+          <p:cNvSpPr/>
+          <p:nvPr/>
+        </p:nvSpPr>
+        <p:spPr>
+          <a:xfrm>
+            <a:off x="10896600" y="4212911"/>
+            <a:ext cx="194141" cy="300177"/>
+          </a:xfrm>
+          <a:prstGeom prst="rect">
+            <a:avLst/>
+          </a:prstGeom>
+          <a:solidFill>
+            <a:srgbClr val="7030A0"/>
+          </a:solidFill>
+          <a:ln>
+            <a:solidFill>
+              <a:srgbClr val="7030A0"/>
+            </a:solidFill>
+          </a:ln>
+          <a:effectLst/>
+        </p:spPr>
+        <p:style>
+          <a:lnRef idx="1">
+            <a:schemeClr val="accent3"/>
+          </a:lnRef>
+          <a:fillRef idx="2">
+            <a:schemeClr val="accent3"/>
+          </a:fillRef>
+          <a:effectRef idx="1">
+            <a:schemeClr val="accent3"/>
+          </a:effectRef>
+          <a:fontRef idx="minor">
+            <a:schemeClr val="dk1"/>
+          </a:fontRef>
+        </p:style>
+        <p:txBody>
+          <a:bodyPr rtlCol="0" anchor="ctr"/>
+          <a:lstStyle/>
+          <a:p>
+            <a:pPr algn="ctr"/>
+            <a:endParaRPr lang="en-SG" sz="1400"/>
+          </a:p>
+        </p:txBody>
+      </p:sp>
+      <p:cxnSp>
+        <p:nvCxnSpPr>
+          <p:cNvPr id="49" name="Straight Arrow Connector 48">
+            <a:extLst>
+              <a:ext uri="{FF2B5EF4-FFF2-40B4-BE49-F238E27FC236}">
+                <a16:creationId xmlns:a16="http://schemas.microsoft.com/office/drawing/2014/main" id="{550D14CF-BEC3-4372-ACC9-ED21B41B80BB}"/>
+              </a:ext>
+            </a:extLst>
+          </p:cNvPr>
+          <p:cNvCxnSpPr>
+            <a:cxnSpLocks/>
+          </p:cNvCxnSpPr>
+          <p:nvPr/>
+        </p:nvCxnSpPr>
+        <p:spPr>
+          <a:xfrm>
+            <a:off x="9266064" y="4267200"/>
+            <a:ext cx="1638995" cy="0"/>
+          </a:xfrm>
+          <a:prstGeom prst="straightConnector1">
+            <a:avLst/>
+          </a:prstGeom>
+          <a:ln w="19050">
+            <a:solidFill>
+              <a:srgbClr val="7030A0"/>
+            </a:solidFill>
+            <a:tailEnd type="arrow"/>
+          </a:ln>
+        </p:spPr>
+        <p:style>
+          <a:lnRef idx="1">
+            <a:schemeClr val="accent1"/>
+          </a:lnRef>
+          <a:fillRef idx="0">
+            <a:schemeClr val="accent1"/>
+          </a:fillRef>
+          <a:effectRef idx="0">
+            <a:schemeClr val="accent1"/>
+          </a:effectRef>
+          <a:fontRef idx="minor">
+            <a:schemeClr val="tx1"/>
+          </a:fontRef>
+        </p:style>
+      </p:cxnSp>
+      <p:sp>
+        <p:nvSpPr>
+          <p:cNvPr id="53" name="TextBox 52">
+            <a:extLst>
+              <a:ext uri="{FF2B5EF4-FFF2-40B4-BE49-F238E27FC236}">
+                <a16:creationId xmlns:a16="http://schemas.microsoft.com/office/drawing/2014/main" id="{054B2561-8A46-4166-951D-EFC4F2D338B2}"/>
               </a:ext>
             </a:extLst>
           </p:cNvPr>
@@ -5083,8 +5306,8 @@
         </p:nvSpPr>
         <p:spPr>
           <a:xfrm>
-            <a:off x="4730513" y="4301654"/>
-            <a:ext cx="621216" cy="215444"/>
+            <a:off x="9201198" y="4006334"/>
+            <a:ext cx="1630515" cy="184666"/>
           </a:xfrm>
           <a:prstGeom prst="rect">
             <a:avLst/>
@@ -5109,18 +5332,77 @@
           </a:lstStyle>
           <a:p>
             <a:r>
-              <a:rPr lang="en-US" dirty="0"/>
-              <a:t>result</a:t>
-            </a:r>
-          </a:p>
-        </p:txBody>
-      </p:sp>
-      <p:sp>
-        <p:nvSpPr>
-          <p:cNvPr id="72" name="TextBox 71">
+              <a:rPr lang="en-US" sz="1200" dirty="0" err="1">
+                <a:solidFill>
+                  <a:srgbClr val="7030A0"/>
+                </a:solidFill>
+              </a:rPr>
+              <a:t>switchToRecordContext</a:t>
+            </a:r>
+            <a:r>
+              <a:rPr lang="en-US" sz="1200" dirty="0">
+                <a:solidFill>
+                  <a:srgbClr val="7030A0"/>
+                </a:solidFill>
+              </a:rPr>
+              <a:t>()</a:t>
+            </a:r>
+            <a:endParaRPr lang="en-US" sz="1200" dirty="0"/>
+          </a:p>
+        </p:txBody>
+      </p:sp>
+      <p:cxnSp>
+        <p:nvCxnSpPr>
+          <p:cNvPr id="58" name="Straight Arrow Connector 57">
             <a:extLst>
               <a:ext uri="{FF2B5EF4-FFF2-40B4-BE49-F238E27FC236}">
-                <a16:creationId xmlns:a16="http://schemas.microsoft.com/office/drawing/2014/main" id="{68167AA0-3158-4F4A-8457-727D82EBCC30}"/>
+                <a16:creationId xmlns:a16="http://schemas.microsoft.com/office/drawing/2014/main" id="{82BC6DBA-B13C-4D82-9516-0F09CB97B7B8}"/>
+              </a:ext>
+            </a:extLst>
+          </p:cNvPr>
+          <p:cNvCxnSpPr>
+            <a:cxnSpLocks/>
+          </p:cNvCxnSpPr>
+          <p:nvPr/>
+        </p:nvCxnSpPr>
+        <p:spPr>
+          <a:xfrm>
+            <a:off x="9266064" y="4491505"/>
+            <a:ext cx="1638995" cy="0"/>
+          </a:xfrm>
+          <a:prstGeom prst="straightConnector1">
+            <a:avLst/>
+          </a:prstGeom>
+          <a:ln w="19050">
+            <a:solidFill>
+              <a:srgbClr val="7030A0"/>
+            </a:solidFill>
+            <a:prstDash val="sysDash"/>
+            <a:headEnd type="arrow" w="med" len="med"/>
+            <a:tailEnd type="none" w="med" len="med"/>
+          </a:ln>
+        </p:spPr>
+        <p:style>
+          <a:lnRef idx="1">
+            <a:schemeClr val="accent1"/>
+          </a:lnRef>
+          <a:fillRef idx="0">
+            <a:schemeClr val="accent1"/>
+          </a:fillRef>
+          <a:effectRef idx="0">
+            <a:schemeClr val="accent1"/>
+          </a:effectRef>
+          <a:fontRef idx="minor">
+            <a:schemeClr val="tx1"/>
+          </a:fontRef>
+        </p:style>
+      </p:cxnSp>
+      <p:sp>
+        <p:nvSpPr>
+          <p:cNvPr id="61" name="TextBox 60">
+            <a:extLst>
+              <a:ext uri="{FF2B5EF4-FFF2-40B4-BE49-F238E27FC236}">
+                <a16:creationId xmlns:a16="http://schemas.microsoft.com/office/drawing/2014/main" id="{4941035E-21BC-403A-B961-06D464F250C0}"/>
               </a:ext>
             </a:extLst>
           </p:cNvPr>
@@ -5129,8 +5411,8 @@
         </p:nvSpPr>
         <p:spPr>
           <a:xfrm>
-            <a:off x="6934200" y="2881189"/>
-            <a:ext cx="1985532" cy="184666"/>
+            <a:off x="6705600" y="4724400"/>
+            <a:ext cx="2137142" cy="184666"/>
           </a:xfrm>
           <a:prstGeom prst="rect">
             <a:avLst/>
@@ -5156,605 +5438,6 @@
           <a:p>
             <a:r>
               <a:rPr lang="en-US" sz="1200" dirty="0" err="1"/>
-              <a:t>updateFIlteredPersonList</a:t>
-            </a:r>
-            <a:r>
-              <a:rPr lang="en-US" sz="1200" dirty="0"/>
-              <a:t>(true)</a:t>
-            </a:r>
-          </a:p>
-        </p:txBody>
-      </p:sp>
-      <p:sp>
-        <p:nvSpPr>
-          <p:cNvPr id="85" name="Rectangle 84">
-            <a:extLst>
-              <a:ext uri="{FF2B5EF4-FFF2-40B4-BE49-F238E27FC236}">
-                <a16:creationId xmlns:a16="http://schemas.microsoft.com/office/drawing/2014/main" id="{3AFEEBFE-32B8-45E5-952F-30F9106A9F10}"/>
-              </a:ext>
-            </a:extLst>
-          </p:cNvPr>
-          <p:cNvSpPr/>
-          <p:nvPr/>
-        </p:nvSpPr>
-        <p:spPr>
-          <a:xfrm>
-            <a:off x="8864033" y="3065954"/>
-            <a:ext cx="231844" cy="1617377"/>
-          </a:xfrm>
-          <a:prstGeom prst="rect">
-            <a:avLst/>
-          </a:prstGeom>
-          <a:solidFill>
-            <a:srgbClr val="7030A0"/>
-          </a:solidFill>
-          <a:ln>
-            <a:solidFill>
-              <a:srgbClr val="7030A0"/>
-            </a:solidFill>
-          </a:ln>
-          <a:effectLst/>
-        </p:spPr>
-        <p:style>
-          <a:lnRef idx="1">
-            <a:schemeClr val="accent3"/>
-          </a:lnRef>
-          <a:fillRef idx="2">
-            <a:schemeClr val="accent3"/>
-          </a:fillRef>
-          <a:effectRef idx="1">
-            <a:schemeClr val="accent3"/>
-          </a:effectRef>
-          <a:fontRef idx="minor">
-            <a:schemeClr val="dk1"/>
-          </a:fontRef>
-        </p:style>
-        <p:txBody>
-          <a:bodyPr rtlCol="0" anchor="ctr"/>
-          <a:lstStyle/>
-          <a:p>
-            <a:pPr algn="ctr"/>
-            <a:endParaRPr lang="en-SG" sz="1400"/>
-          </a:p>
-        </p:txBody>
-      </p:sp>
-      <p:cxnSp>
-        <p:nvCxnSpPr>
-          <p:cNvPr id="87" name="Straight Arrow Connector 86">
-            <a:extLst>
-              <a:ext uri="{FF2B5EF4-FFF2-40B4-BE49-F238E27FC236}">
-                <a16:creationId xmlns:a16="http://schemas.microsoft.com/office/drawing/2014/main" id="{47C11F1D-CE85-4565-AEBF-89F53B5CC4F1}"/>
-              </a:ext>
-            </a:extLst>
-          </p:cNvPr>
-          <p:cNvCxnSpPr>
-            <a:cxnSpLocks/>
-          </p:cNvCxnSpPr>
-          <p:nvPr/>
-        </p:nvCxnSpPr>
-        <p:spPr>
-          <a:xfrm>
-            <a:off x="6834161" y="3338524"/>
-            <a:ext cx="1985532" cy="5466"/>
-          </a:xfrm>
-          <a:prstGeom prst="straightConnector1">
-            <a:avLst/>
-          </a:prstGeom>
-          <a:ln w="19050">
-            <a:solidFill>
-              <a:srgbClr val="7030A0"/>
-            </a:solidFill>
-            <a:prstDash val="sysDash"/>
-            <a:headEnd type="arrow" w="med" len="med"/>
-            <a:tailEnd type="none" w="med" len="med"/>
-          </a:ln>
-        </p:spPr>
-        <p:style>
-          <a:lnRef idx="1">
-            <a:schemeClr val="accent1"/>
-          </a:lnRef>
-          <a:fillRef idx="0">
-            <a:schemeClr val="accent1"/>
-          </a:fillRef>
-          <a:effectRef idx="0">
-            <a:schemeClr val="accent1"/>
-          </a:effectRef>
-          <a:fontRef idx="minor">
-            <a:schemeClr val="tx1"/>
-          </a:fontRef>
-        </p:style>
-      </p:cxnSp>
-      <p:sp>
-        <p:nvSpPr>
-          <p:cNvPr id="41" name="Rectangle 62">
-            <a:extLst>
-              <a:ext uri="{FF2B5EF4-FFF2-40B4-BE49-F238E27FC236}">
-                <a16:creationId xmlns:a16="http://schemas.microsoft.com/office/drawing/2014/main" id="{B78A3FC8-6CAF-49AD-A43C-FFC02BAE2D9C}"/>
-              </a:ext>
-            </a:extLst>
-          </p:cNvPr>
-          <p:cNvSpPr/>
-          <p:nvPr/>
-        </p:nvSpPr>
-        <p:spPr>
-          <a:xfrm>
-            <a:off x="10342430" y="2318115"/>
-            <a:ext cx="996792" cy="300180"/>
-          </a:xfrm>
-          <a:prstGeom prst="rect">
-            <a:avLst/>
-          </a:prstGeom>
-          <a:solidFill>
-            <a:srgbClr val="7030A0"/>
-          </a:solidFill>
-          <a:ln w="19050">
-            <a:solidFill>
-              <a:srgbClr val="7030A0"/>
-            </a:solidFill>
-          </a:ln>
-          <a:effectLst/>
-        </p:spPr>
-        <p:style>
-          <a:lnRef idx="1">
-            <a:schemeClr val="accent2"/>
-          </a:lnRef>
-          <a:fillRef idx="2">
-            <a:schemeClr val="accent2"/>
-          </a:fillRef>
-          <a:effectRef idx="1">
-            <a:schemeClr val="accent2"/>
-          </a:effectRef>
-          <a:fontRef idx="minor">
-            <a:schemeClr val="dk1"/>
-          </a:fontRef>
-        </p:style>
-        <p:txBody>
-          <a:bodyPr rtlCol="0" anchor="ctr"/>
-          <a:lstStyle/>
-          <a:p>
-            <a:pPr algn="ctr"/>
-            <a:r>
-              <a:rPr lang="en-US" sz="1600" dirty="0">
-                <a:solidFill>
-                  <a:schemeClr val="bg1"/>
-                </a:solidFill>
-              </a:rPr>
-              <a:t>: Context</a:t>
-            </a:r>
-            <a:endParaRPr lang="en-SG" sz="1600" dirty="0">
-              <a:solidFill>
-                <a:schemeClr val="bg1"/>
-              </a:solidFill>
-            </a:endParaRPr>
-          </a:p>
-        </p:txBody>
-      </p:sp>
-      <p:cxnSp>
-        <p:nvCxnSpPr>
-          <p:cNvPr id="45" name="Straight Connector 44">
-            <a:extLst>
-              <a:ext uri="{FF2B5EF4-FFF2-40B4-BE49-F238E27FC236}">
-                <a16:creationId xmlns:a16="http://schemas.microsoft.com/office/drawing/2014/main" id="{CFD98A32-7C4C-4E96-8F24-54B792BF6158}"/>
-              </a:ext>
-            </a:extLst>
-          </p:cNvPr>
-          <p:cNvCxnSpPr>
-            <a:cxnSpLocks/>
-          </p:cNvCxnSpPr>
-          <p:nvPr/>
-        </p:nvCxnSpPr>
-        <p:spPr>
-          <a:xfrm>
-            <a:off x="10898476" y="2358061"/>
-            <a:ext cx="6283" cy="2604539"/>
-          </a:xfrm>
-          <a:prstGeom prst="line">
-            <a:avLst/>
-          </a:prstGeom>
-          <a:ln w="19050">
-            <a:solidFill>
-              <a:srgbClr val="7030A0"/>
-            </a:solidFill>
-            <a:prstDash val="sysDash"/>
-          </a:ln>
-          <a:effectLst/>
-        </p:spPr>
-        <p:style>
-          <a:lnRef idx="1">
-            <a:schemeClr val="accent1"/>
-          </a:lnRef>
-          <a:fillRef idx="2">
-            <a:schemeClr val="accent1"/>
-          </a:fillRef>
-          <a:effectRef idx="1">
-            <a:schemeClr val="accent1"/>
-          </a:effectRef>
-          <a:fontRef idx="minor">
-            <a:schemeClr val="dk1"/>
-          </a:fontRef>
-        </p:style>
-      </p:cxnSp>
-      <p:sp>
-        <p:nvSpPr>
-          <p:cNvPr id="48" name="Rectangle 47">
-            <a:extLst>
-              <a:ext uri="{FF2B5EF4-FFF2-40B4-BE49-F238E27FC236}">
-                <a16:creationId xmlns:a16="http://schemas.microsoft.com/office/drawing/2014/main" id="{A837F9B3-2EF2-40A4-B6F1-80480B194316}"/>
-              </a:ext>
-            </a:extLst>
-          </p:cNvPr>
-          <p:cNvSpPr/>
-          <p:nvPr/>
-        </p:nvSpPr>
-        <p:spPr>
-          <a:xfrm>
-            <a:off x="10789358" y="3654163"/>
-            <a:ext cx="157136" cy="384438"/>
-          </a:xfrm>
-          <a:prstGeom prst="rect">
-            <a:avLst/>
-          </a:prstGeom>
-          <a:solidFill>
-            <a:srgbClr val="7030A0"/>
-          </a:solidFill>
-          <a:ln>
-            <a:solidFill>
-              <a:srgbClr val="7030A0"/>
-            </a:solidFill>
-          </a:ln>
-          <a:effectLst/>
-        </p:spPr>
-        <p:style>
-          <a:lnRef idx="1">
-            <a:schemeClr val="accent3"/>
-          </a:lnRef>
-          <a:fillRef idx="2">
-            <a:schemeClr val="accent3"/>
-          </a:fillRef>
-          <a:effectRef idx="1">
-            <a:schemeClr val="accent3"/>
-          </a:effectRef>
-          <a:fontRef idx="minor">
-            <a:schemeClr val="dk1"/>
-          </a:fontRef>
-        </p:style>
-        <p:txBody>
-          <a:bodyPr rtlCol="0" anchor="ctr"/>
-          <a:lstStyle/>
-          <a:p>
-            <a:pPr algn="ctr"/>
-            <a:endParaRPr lang="en-SG" sz="1400"/>
-          </a:p>
-        </p:txBody>
-      </p:sp>
-      <p:cxnSp>
-        <p:nvCxnSpPr>
-          <p:cNvPr id="49" name="Straight Arrow Connector 48">
-            <a:extLst>
-              <a:ext uri="{FF2B5EF4-FFF2-40B4-BE49-F238E27FC236}">
-                <a16:creationId xmlns:a16="http://schemas.microsoft.com/office/drawing/2014/main" id="{550D14CF-BEC3-4372-ACC9-ED21B41B80BB}"/>
-              </a:ext>
-            </a:extLst>
-          </p:cNvPr>
-          <p:cNvCxnSpPr>
-            <a:cxnSpLocks/>
-          </p:cNvCxnSpPr>
-          <p:nvPr/>
-        </p:nvCxnSpPr>
-        <p:spPr>
-          <a:xfrm>
-            <a:off x="9097650" y="3719231"/>
-            <a:ext cx="1691707" cy="0"/>
-          </a:xfrm>
-          <a:prstGeom prst="straightConnector1">
-            <a:avLst/>
-          </a:prstGeom>
-          <a:ln w="19050">
-            <a:solidFill>
-              <a:srgbClr val="7030A0"/>
-            </a:solidFill>
-            <a:tailEnd type="arrow"/>
-          </a:ln>
-        </p:spPr>
-        <p:style>
-          <a:lnRef idx="1">
-            <a:schemeClr val="accent1"/>
-          </a:lnRef>
-          <a:fillRef idx="0">
-            <a:schemeClr val="accent1"/>
-          </a:fillRef>
-          <a:effectRef idx="0">
-            <a:schemeClr val="accent1"/>
-          </a:effectRef>
-          <a:fontRef idx="minor">
-            <a:schemeClr val="tx1"/>
-          </a:fontRef>
-        </p:style>
-      </p:cxnSp>
-      <p:sp>
-        <p:nvSpPr>
-          <p:cNvPr id="53" name="TextBox 52">
-            <a:extLst>
-              <a:ext uri="{FF2B5EF4-FFF2-40B4-BE49-F238E27FC236}">
-                <a16:creationId xmlns:a16="http://schemas.microsoft.com/office/drawing/2014/main" id="{054B2561-8A46-4166-951D-EFC4F2D338B2}"/>
-              </a:ext>
-            </a:extLst>
-          </p:cNvPr>
-          <p:cNvSpPr txBox="1"/>
-          <p:nvPr/>
-        </p:nvSpPr>
-        <p:spPr>
-          <a:xfrm>
-            <a:off x="9099107" y="3429000"/>
-            <a:ext cx="1630515" cy="184666"/>
-          </a:xfrm>
-          <a:prstGeom prst="rect">
-            <a:avLst/>
-          </a:prstGeom>
-          <a:noFill/>
-        </p:spPr>
-        <p:txBody>
-          <a:bodyPr wrap="square" lIns="0" tIns="0" rIns="0" bIns="0" rtlCol="0">
-            <a:spAutoFit/>
-          </a:bodyPr>
-          <a:lstStyle>
-            <a:defPPr>
-              <a:defRPr lang="en-US"/>
-            </a:defPPr>
-            <a:lvl1pPr algn="r">
-              <a:defRPr sz="1400">
-                <a:solidFill>
-                  <a:srgbClr val="0070C0"/>
-                </a:solidFill>
-              </a:defRPr>
-            </a:lvl1pPr>
-          </a:lstStyle>
-          <a:p>
-            <a:r>
-              <a:rPr lang="en-US" sz="1200" dirty="0" err="1">
-                <a:solidFill>
-                  <a:srgbClr val="7030A0"/>
-                </a:solidFill>
-              </a:rPr>
-              <a:t>switchToRecordContext</a:t>
-            </a:r>
-            <a:r>
-              <a:rPr lang="en-US" sz="1200" dirty="0">
-                <a:solidFill>
-                  <a:srgbClr val="7030A0"/>
-                </a:solidFill>
-              </a:rPr>
-              <a:t>()</a:t>
-            </a:r>
-            <a:endParaRPr lang="en-US" sz="1200" dirty="0"/>
-          </a:p>
-        </p:txBody>
-      </p:sp>
-      <p:cxnSp>
-        <p:nvCxnSpPr>
-          <p:cNvPr id="58" name="Straight Arrow Connector 57">
-            <a:extLst>
-              <a:ext uri="{FF2B5EF4-FFF2-40B4-BE49-F238E27FC236}">
-                <a16:creationId xmlns:a16="http://schemas.microsoft.com/office/drawing/2014/main" id="{82BC6DBA-B13C-4D82-9516-0F09CB97B7B8}"/>
-              </a:ext>
-            </a:extLst>
-          </p:cNvPr>
-          <p:cNvCxnSpPr>
-            <a:cxnSpLocks/>
-          </p:cNvCxnSpPr>
-          <p:nvPr/>
-        </p:nvCxnSpPr>
-        <p:spPr>
-          <a:xfrm>
-            <a:off x="9116747" y="4038600"/>
-            <a:ext cx="1612875" cy="0"/>
-          </a:xfrm>
-          <a:prstGeom prst="straightConnector1">
-            <a:avLst/>
-          </a:prstGeom>
-          <a:ln w="19050">
-            <a:solidFill>
-              <a:srgbClr val="7030A0"/>
-            </a:solidFill>
-            <a:prstDash val="sysDash"/>
-            <a:headEnd type="arrow" w="med" len="med"/>
-            <a:tailEnd type="none" w="med" len="med"/>
-          </a:ln>
-        </p:spPr>
-        <p:style>
-          <a:lnRef idx="1">
-            <a:schemeClr val="accent1"/>
-          </a:lnRef>
-          <a:fillRef idx="0">
-            <a:schemeClr val="accent1"/>
-          </a:fillRef>
-          <a:effectRef idx="0">
-            <a:schemeClr val="accent1"/>
-          </a:effectRef>
-          <a:fontRef idx="minor">
-            <a:schemeClr val="tx1"/>
-          </a:fontRef>
-        </p:style>
-      </p:cxnSp>
-      <p:cxnSp>
-        <p:nvCxnSpPr>
-          <p:cNvPr id="54" name="Straight Arrow Connector 53">
-            <a:extLst>
-              <a:ext uri="{FF2B5EF4-FFF2-40B4-BE49-F238E27FC236}">
-                <a16:creationId xmlns:a16="http://schemas.microsoft.com/office/drawing/2014/main" id="{5F8E7046-A7A2-408F-AD29-931258BFA95A}"/>
-              </a:ext>
-            </a:extLst>
-          </p:cNvPr>
-          <p:cNvCxnSpPr>
-            <a:cxnSpLocks/>
-          </p:cNvCxnSpPr>
-          <p:nvPr/>
-        </p:nvCxnSpPr>
-        <p:spPr>
-          <a:xfrm>
-            <a:off x="6783793" y="3641109"/>
-            <a:ext cx="2035621" cy="19221"/>
-          </a:xfrm>
-          <a:prstGeom prst="straightConnector1">
-            <a:avLst/>
-          </a:prstGeom>
-          <a:ln w="19050">
-            <a:solidFill>
-              <a:srgbClr val="7030A0"/>
-            </a:solidFill>
-            <a:tailEnd type="arrow"/>
-          </a:ln>
-        </p:spPr>
-        <p:style>
-          <a:lnRef idx="1">
-            <a:schemeClr val="accent1"/>
-          </a:lnRef>
-          <a:fillRef idx="0">
-            <a:schemeClr val="accent1"/>
-          </a:fillRef>
-          <a:effectRef idx="0">
-            <a:schemeClr val="accent1"/>
-          </a:effectRef>
-          <a:fontRef idx="minor">
-            <a:schemeClr val="tx1"/>
-          </a:fontRef>
-        </p:style>
-      </p:cxnSp>
-      <p:sp>
-        <p:nvSpPr>
-          <p:cNvPr id="55" name="TextBox 54">
-            <a:extLst>
-              <a:ext uri="{FF2B5EF4-FFF2-40B4-BE49-F238E27FC236}">
-                <a16:creationId xmlns:a16="http://schemas.microsoft.com/office/drawing/2014/main" id="{8AADD024-3ADF-470D-960F-49C6B3C35FBB}"/>
-              </a:ext>
-            </a:extLst>
-          </p:cNvPr>
-          <p:cNvSpPr txBox="1"/>
-          <p:nvPr/>
-        </p:nvSpPr>
-        <p:spPr>
-          <a:xfrm>
-            <a:off x="6668566" y="3397482"/>
-            <a:ext cx="1985532" cy="184666"/>
-          </a:xfrm>
-          <a:prstGeom prst="rect">
-            <a:avLst/>
-          </a:prstGeom>
-          <a:noFill/>
-        </p:spPr>
-        <p:txBody>
-          <a:bodyPr wrap="square" lIns="0" tIns="0" rIns="0" bIns="0" rtlCol="0">
-            <a:spAutoFit/>
-          </a:bodyPr>
-          <a:lstStyle>
-            <a:defPPr>
-              <a:defRPr lang="en-US"/>
-            </a:defPPr>
-            <a:lvl1pPr algn="r">
-              <a:defRPr sz="1400">
-                <a:solidFill>
-                  <a:srgbClr val="0070C0"/>
-                </a:solidFill>
-              </a:defRPr>
-            </a:lvl1pPr>
-          </a:lstStyle>
-          <a:p>
-            <a:r>
-              <a:rPr lang="en-US" sz="1200" dirty="0" err="1"/>
-              <a:t>switchToRecordContext</a:t>
-            </a:r>
-            <a:r>
-              <a:rPr lang="en-US" sz="1200" dirty="0"/>
-              <a:t>()</a:t>
-            </a:r>
-          </a:p>
-        </p:txBody>
-      </p:sp>
-      <p:cxnSp>
-        <p:nvCxnSpPr>
-          <p:cNvPr id="60" name="Straight Arrow Connector 59">
-            <a:extLst>
-              <a:ext uri="{FF2B5EF4-FFF2-40B4-BE49-F238E27FC236}">
-                <a16:creationId xmlns:a16="http://schemas.microsoft.com/office/drawing/2014/main" id="{E4824D14-A5EA-4664-89FC-D8646777B1B6}"/>
-              </a:ext>
-            </a:extLst>
-          </p:cNvPr>
-          <p:cNvCxnSpPr>
-            <a:cxnSpLocks/>
-          </p:cNvCxnSpPr>
-          <p:nvPr/>
-        </p:nvCxnSpPr>
-        <p:spPr>
-          <a:xfrm>
-            <a:off x="6781800" y="4343400"/>
-            <a:ext cx="1981200" cy="0"/>
-          </a:xfrm>
-          <a:prstGeom prst="straightConnector1">
-            <a:avLst/>
-          </a:prstGeom>
-          <a:ln w="19050">
-            <a:solidFill>
-              <a:srgbClr val="7030A0"/>
-            </a:solidFill>
-            <a:tailEnd type="arrow"/>
-          </a:ln>
-        </p:spPr>
-        <p:style>
-          <a:lnRef idx="1">
-            <a:schemeClr val="accent1"/>
-          </a:lnRef>
-          <a:fillRef idx="0">
-            <a:schemeClr val="accent1"/>
-          </a:fillRef>
-          <a:effectRef idx="0">
-            <a:schemeClr val="accent1"/>
-          </a:effectRef>
-          <a:fontRef idx="minor">
-            <a:schemeClr val="tx1"/>
-          </a:fontRef>
-        </p:style>
-      </p:cxnSp>
-      <p:sp>
-        <p:nvSpPr>
-          <p:cNvPr id="61" name="TextBox 60">
-            <a:extLst>
-              <a:ext uri="{FF2B5EF4-FFF2-40B4-BE49-F238E27FC236}">
-                <a16:creationId xmlns:a16="http://schemas.microsoft.com/office/drawing/2014/main" id="{4941035E-21BC-403A-B961-06D464F250C0}"/>
-              </a:ext>
-            </a:extLst>
-          </p:cNvPr>
-          <p:cNvSpPr txBox="1"/>
-          <p:nvPr/>
-        </p:nvSpPr>
-        <p:spPr>
-          <a:xfrm>
-            <a:off x="6629400" y="4094593"/>
-            <a:ext cx="1985532" cy="184666"/>
-          </a:xfrm>
-          <a:prstGeom prst="rect">
-            <a:avLst/>
-          </a:prstGeom>
-          <a:noFill/>
-        </p:spPr>
-        <p:txBody>
-          <a:bodyPr wrap="square" lIns="0" tIns="0" rIns="0" bIns="0" rtlCol="0">
-            <a:spAutoFit/>
-          </a:bodyPr>
-          <a:lstStyle>
-            <a:defPPr>
-              <a:defRPr lang="en-US"/>
-            </a:defPPr>
-            <a:lvl1pPr algn="r">
-              <a:defRPr sz="1400">
-                <a:solidFill>
-                  <a:srgbClr val="0070C0"/>
-                </a:solidFill>
-              </a:defRPr>
-            </a:lvl1pPr>
-          </a:lstStyle>
-          <a:p>
-            <a:r>
-              <a:rPr lang="en-US" sz="1200" dirty="0" err="1"/>
               <a:t>updateFilteredRecordList</a:t>
             </a:r>
             <a:r>
@@ -5779,9 +5462,9 @@
           <p:nvPr/>
         </p:nvCxnSpPr>
         <p:spPr>
-          <a:xfrm flipV="1">
-            <a:off x="6800399" y="3832884"/>
-            <a:ext cx="1979207" cy="1"/>
+          <a:xfrm>
+            <a:off x="7191804" y="4560577"/>
+            <a:ext cx="1766394" cy="0"/>
           </a:xfrm>
           <a:prstGeom prst="straightConnector1">
             <a:avLst/>
@@ -5826,8 +5509,8 @@
         </p:nvCxnSpPr>
         <p:spPr>
           <a:xfrm>
-            <a:off x="6759171" y="4542451"/>
-            <a:ext cx="2003829" cy="13122"/>
+            <a:off x="7175059" y="3860732"/>
+            <a:ext cx="1813297" cy="0"/>
           </a:xfrm>
           <a:prstGeom prst="straightConnector1">
             <a:avLst/>
@@ -5870,7 +5553,7 @@
         </p:nvSpPr>
         <p:spPr>
           <a:xfrm>
-            <a:off x="6553214" y="4801029"/>
+            <a:off x="6944533" y="5395938"/>
             <a:ext cx="258404" cy="261610"/>
           </a:xfrm>
           <a:prstGeom prst="rect">
@@ -5895,6 +5578,466 @@
           </a:p>
         </p:txBody>
       </p:sp>
+      <p:cxnSp>
+        <p:nvCxnSpPr>
+          <p:cNvPr id="63" name="Straight Arrow Connector 62">
+            <a:extLst>
+              <a:ext uri="{FF2B5EF4-FFF2-40B4-BE49-F238E27FC236}">
+                <a16:creationId xmlns:a16="http://schemas.microsoft.com/office/drawing/2014/main" id="{D008FA79-2CE2-429B-914D-7A57452A8A11}"/>
+              </a:ext>
+            </a:extLst>
+          </p:cNvPr>
+          <p:cNvCxnSpPr>
+            <a:cxnSpLocks/>
+          </p:cNvCxnSpPr>
+          <p:nvPr/>
+        </p:nvCxnSpPr>
+        <p:spPr>
+          <a:xfrm>
+            <a:off x="1437674" y="2540675"/>
+            <a:ext cx="2730218" cy="15727"/>
+          </a:xfrm>
+          <a:prstGeom prst="straightConnector1">
+            <a:avLst/>
+          </a:prstGeom>
+          <a:ln w="19050">
+            <a:solidFill>
+              <a:srgbClr val="0070C0"/>
+            </a:solidFill>
+            <a:tailEnd type="arrow"/>
+          </a:ln>
+        </p:spPr>
+        <p:style>
+          <a:lnRef idx="1">
+            <a:schemeClr val="accent1"/>
+          </a:lnRef>
+          <a:fillRef idx="0">
+            <a:schemeClr val="accent1"/>
+          </a:fillRef>
+          <a:effectRef idx="0">
+            <a:schemeClr val="accent1"/>
+          </a:effectRef>
+          <a:fontRef idx="minor">
+            <a:schemeClr val="tx1"/>
+          </a:fontRef>
+        </p:style>
+      </p:cxnSp>
+      <p:sp>
+        <p:nvSpPr>
+          <p:cNvPr id="70" name="TextBox 69">
+            <a:extLst>
+              <a:ext uri="{FF2B5EF4-FFF2-40B4-BE49-F238E27FC236}">
+                <a16:creationId xmlns:a16="http://schemas.microsoft.com/office/drawing/2014/main" id="{4902BEB4-C7B8-4432-8A26-60F69BCAA466}"/>
+              </a:ext>
+            </a:extLst>
+          </p:cNvPr>
+          <p:cNvSpPr txBox="1"/>
+          <p:nvPr/>
+        </p:nvSpPr>
+        <p:spPr>
+          <a:xfrm>
+            <a:off x="2362200" y="2299156"/>
+            <a:ext cx="835441" cy="215444"/>
+          </a:xfrm>
+          <a:prstGeom prst="rect">
+            <a:avLst/>
+          </a:prstGeom>
+          <a:noFill/>
+        </p:spPr>
+        <p:txBody>
+          <a:bodyPr wrap="square" lIns="0" tIns="0" rIns="0" bIns="0" rtlCol="0">
+            <a:spAutoFit/>
+          </a:bodyPr>
+          <a:lstStyle>
+            <a:defPPr>
+              <a:defRPr lang="en-US"/>
+            </a:defPPr>
+            <a:lvl1pPr algn="r">
+              <a:defRPr sz="1400">
+                <a:solidFill>
+                  <a:srgbClr val="0070C0"/>
+                </a:solidFill>
+              </a:defRPr>
+            </a:lvl1pPr>
+          </a:lstStyle>
+          <a:p>
+            <a:r>
+              <a:rPr lang="en-US" dirty="0"/>
+              <a:t>parse(“1”)</a:t>
+            </a:r>
+          </a:p>
+        </p:txBody>
+      </p:sp>
+      <p:cxnSp>
+        <p:nvCxnSpPr>
+          <p:cNvPr id="74" name="Straight Arrow Connector 73">
+            <a:extLst>
+              <a:ext uri="{FF2B5EF4-FFF2-40B4-BE49-F238E27FC236}">
+                <a16:creationId xmlns:a16="http://schemas.microsoft.com/office/drawing/2014/main" id="{5C9CFAFB-DCA9-45DB-A6BB-FEED190F313A}"/>
+              </a:ext>
+            </a:extLst>
+          </p:cNvPr>
+          <p:cNvCxnSpPr>
+            <a:cxnSpLocks/>
+          </p:cNvCxnSpPr>
+          <p:nvPr/>
+        </p:nvCxnSpPr>
+        <p:spPr>
+          <a:xfrm>
+            <a:off x="4336709" y="2969386"/>
+            <a:ext cx="2735563" cy="0"/>
+          </a:xfrm>
+          <a:prstGeom prst="straightConnector1">
+            <a:avLst/>
+          </a:prstGeom>
+          <a:ln w="19050">
+            <a:solidFill>
+              <a:srgbClr val="0070C0"/>
+            </a:solidFill>
+            <a:prstDash val="sysDash"/>
+            <a:headEnd type="arrow" w="med" len="med"/>
+            <a:tailEnd type="none" w="med" len="med"/>
+          </a:ln>
+        </p:spPr>
+        <p:style>
+          <a:lnRef idx="1">
+            <a:schemeClr val="accent1"/>
+          </a:lnRef>
+          <a:fillRef idx="0">
+            <a:schemeClr val="accent1"/>
+          </a:fillRef>
+          <a:effectRef idx="0">
+            <a:schemeClr val="accent1"/>
+          </a:effectRef>
+          <a:fontRef idx="minor">
+            <a:schemeClr val="tx1"/>
+          </a:fontRef>
+        </p:style>
+      </p:cxnSp>
+      <p:cxnSp>
+        <p:nvCxnSpPr>
+          <p:cNvPr id="75" name="Straight Arrow Connector 74">
+            <a:extLst>
+              <a:ext uri="{FF2B5EF4-FFF2-40B4-BE49-F238E27FC236}">
+                <a16:creationId xmlns:a16="http://schemas.microsoft.com/office/drawing/2014/main" id="{4BAC3F9D-64AE-4A06-8E9A-FFD84B136048}"/>
+              </a:ext>
+            </a:extLst>
+          </p:cNvPr>
+          <p:cNvCxnSpPr>
+            <a:cxnSpLocks/>
+          </p:cNvCxnSpPr>
+          <p:nvPr/>
+        </p:nvCxnSpPr>
+        <p:spPr>
+          <a:xfrm>
+            <a:off x="1437674" y="3052380"/>
+            <a:ext cx="2753326" cy="0"/>
+          </a:xfrm>
+          <a:prstGeom prst="straightConnector1">
+            <a:avLst/>
+          </a:prstGeom>
+          <a:ln w="19050">
+            <a:solidFill>
+              <a:srgbClr val="0070C0"/>
+            </a:solidFill>
+            <a:prstDash val="sysDash"/>
+            <a:headEnd type="arrow" w="med" len="med"/>
+            <a:tailEnd type="none" w="med" len="med"/>
+          </a:ln>
+        </p:spPr>
+        <p:style>
+          <a:lnRef idx="1">
+            <a:schemeClr val="accent1"/>
+          </a:lnRef>
+          <a:fillRef idx="0">
+            <a:schemeClr val="accent1"/>
+          </a:fillRef>
+          <a:effectRef idx="0">
+            <a:schemeClr val="accent1"/>
+          </a:effectRef>
+          <a:fontRef idx="minor">
+            <a:schemeClr val="tx1"/>
+          </a:fontRef>
+        </p:style>
+      </p:cxnSp>
+      <p:sp>
+        <p:nvSpPr>
+          <p:cNvPr id="78" name="TextBox 77">
+            <a:extLst>
+              <a:ext uri="{FF2B5EF4-FFF2-40B4-BE49-F238E27FC236}">
+                <a16:creationId xmlns:a16="http://schemas.microsoft.com/office/drawing/2014/main" id="{9CD6BEF3-B99C-4006-86DD-C6A5A84062AC}"/>
+              </a:ext>
+            </a:extLst>
+          </p:cNvPr>
+          <p:cNvSpPr txBox="1"/>
+          <p:nvPr/>
+        </p:nvSpPr>
+        <p:spPr>
+          <a:xfrm>
+            <a:off x="6629400" y="3468724"/>
+            <a:ext cx="1985532" cy="184666"/>
+          </a:xfrm>
+          <a:prstGeom prst="rect">
+            <a:avLst/>
+          </a:prstGeom>
+          <a:noFill/>
+        </p:spPr>
+        <p:txBody>
+          <a:bodyPr wrap="square" lIns="0" tIns="0" rIns="0" bIns="0" rtlCol="0">
+            <a:spAutoFit/>
+          </a:bodyPr>
+          <a:lstStyle>
+            <a:defPPr>
+              <a:defRPr lang="en-US"/>
+            </a:defPPr>
+            <a:lvl1pPr algn="r">
+              <a:defRPr sz="1400">
+                <a:solidFill>
+                  <a:srgbClr val="0070C0"/>
+                </a:solidFill>
+              </a:defRPr>
+            </a:lvl1pPr>
+          </a:lstStyle>
+          <a:p>
+            <a:r>
+              <a:rPr lang="en-US" sz="1200" dirty="0" err="1"/>
+              <a:t>getFilteredEventList</a:t>
+            </a:r>
+            <a:r>
+              <a:rPr lang="en-US" sz="1200" dirty="0"/>
+              <a:t>()</a:t>
+            </a:r>
+          </a:p>
+        </p:txBody>
+      </p:sp>
+      <p:cxnSp>
+        <p:nvCxnSpPr>
+          <p:cNvPr id="79" name="Straight Arrow Connector 78">
+            <a:extLst>
+              <a:ext uri="{FF2B5EF4-FFF2-40B4-BE49-F238E27FC236}">
+                <a16:creationId xmlns:a16="http://schemas.microsoft.com/office/drawing/2014/main" id="{DB5A1AC1-CCA1-48A2-A312-7EA9E4573836}"/>
+              </a:ext>
+            </a:extLst>
+          </p:cNvPr>
+          <p:cNvCxnSpPr>
+            <a:cxnSpLocks/>
+          </p:cNvCxnSpPr>
+          <p:nvPr/>
+        </p:nvCxnSpPr>
+        <p:spPr>
+          <a:xfrm flipV="1">
+            <a:off x="7202937" y="5123325"/>
+            <a:ext cx="1681823" cy="4268"/>
+          </a:xfrm>
+          <a:prstGeom prst="straightConnector1">
+            <a:avLst/>
+          </a:prstGeom>
+          <a:ln w="19050">
+            <a:solidFill>
+              <a:srgbClr val="7030A0"/>
+            </a:solidFill>
+            <a:prstDash val="sysDash"/>
+            <a:headEnd type="arrow" w="med" len="med"/>
+            <a:tailEnd type="none" w="med" len="med"/>
+          </a:ln>
+        </p:spPr>
+        <p:style>
+          <a:lnRef idx="1">
+            <a:schemeClr val="accent1"/>
+          </a:lnRef>
+          <a:fillRef idx="0">
+            <a:schemeClr val="accent1"/>
+          </a:fillRef>
+          <a:effectRef idx="0">
+            <a:schemeClr val="accent1"/>
+          </a:effectRef>
+          <a:fontRef idx="minor">
+            <a:schemeClr val="tx1"/>
+          </a:fontRef>
+        </p:style>
+      </p:cxnSp>
+      <p:cxnSp>
+        <p:nvCxnSpPr>
+          <p:cNvPr id="86" name="Straight Arrow Connector 85">
+            <a:extLst>
+              <a:ext uri="{FF2B5EF4-FFF2-40B4-BE49-F238E27FC236}">
+                <a16:creationId xmlns:a16="http://schemas.microsoft.com/office/drawing/2014/main" id="{0A9ED2BB-2B56-4FD2-9ED4-33301C8F992D}"/>
+              </a:ext>
+            </a:extLst>
+          </p:cNvPr>
+          <p:cNvCxnSpPr>
+            <a:cxnSpLocks/>
+          </p:cNvCxnSpPr>
+          <p:nvPr/>
+        </p:nvCxnSpPr>
+        <p:spPr>
+          <a:xfrm>
+            <a:off x="7191804" y="3676320"/>
+            <a:ext cx="1766394" cy="0"/>
+          </a:xfrm>
+          <a:prstGeom prst="straightConnector1">
+            <a:avLst/>
+          </a:prstGeom>
+          <a:ln w="19050">
+            <a:solidFill>
+              <a:srgbClr val="0070C0"/>
+            </a:solidFill>
+            <a:tailEnd type="arrow"/>
+          </a:ln>
+        </p:spPr>
+        <p:style>
+          <a:lnRef idx="1">
+            <a:schemeClr val="accent1"/>
+          </a:lnRef>
+          <a:fillRef idx="0">
+            <a:schemeClr val="accent1"/>
+          </a:fillRef>
+          <a:effectRef idx="0">
+            <a:schemeClr val="accent1"/>
+          </a:effectRef>
+          <a:fontRef idx="minor">
+            <a:schemeClr val="tx1"/>
+          </a:fontRef>
+        </p:style>
+      </p:cxnSp>
+      <p:cxnSp>
+        <p:nvCxnSpPr>
+          <p:cNvPr id="88" name="Straight Arrow Connector 87">
+            <a:extLst>
+              <a:ext uri="{FF2B5EF4-FFF2-40B4-BE49-F238E27FC236}">
+                <a16:creationId xmlns:a16="http://schemas.microsoft.com/office/drawing/2014/main" id="{43D1400C-85E2-49BA-A55A-7178A554A5C5}"/>
+              </a:ext>
+            </a:extLst>
+          </p:cNvPr>
+          <p:cNvCxnSpPr>
+            <a:cxnSpLocks/>
+          </p:cNvCxnSpPr>
+          <p:nvPr/>
+        </p:nvCxnSpPr>
+        <p:spPr>
+          <a:xfrm>
+            <a:off x="7162800" y="4191000"/>
+            <a:ext cx="1795398" cy="0"/>
+          </a:xfrm>
+          <a:prstGeom prst="straightConnector1">
+            <a:avLst/>
+          </a:prstGeom>
+          <a:ln w="19050">
+            <a:solidFill>
+              <a:srgbClr val="0070C0"/>
+            </a:solidFill>
+            <a:tailEnd type="arrow"/>
+          </a:ln>
+        </p:spPr>
+        <p:style>
+          <a:lnRef idx="1">
+            <a:schemeClr val="accent1"/>
+          </a:lnRef>
+          <a:fillRef idx="0">
+            <a:schemeClr val="accent1"/>
+          </a:fillRef>
+          <a:effectRef idx="0">
+            <a:schemeClr val="accent1"/>
+          </a:effectRef>
+          <a:fontRef idx="minor">
+            <a:schemeClr val="tx1"/>
+          </a:fontRef>
+        </p:style>
+      </p:cxnSp>
+      <p:sp>
+        <p:nvSpPr>
+          <p:cNvPr id="91" name="TextBox 90">
+            <a:extLst>
+              <a:ext uri="{FF2B5EF4-FFF2-40B4-BE49-F238E27FC236}">
+                <a16:creationId xmlns:a16="http://schemas.microsoft.com/office/drawing/2014/main" id="{B9BD9B17-6133-4D83-A7A9-A7DDD652E15F}"/>
+              </a:ext>
+            </a:extLst>
+          </p:cNvPr>
+          <p:cNvSpPr txBox="1"/>
+          <p:nvPr/>
+        </p:nvSpPr>
+        <p:spPr>
+          <a:xfrm>
+            <a:off x="6853668" y="3959212"/>
+            <a:ext cx="1985532" cy="184666"/>
+          </a:xfrm>
+          <a:prstGeom prst="rect">
+            <a:avLst/>
+          </a:prstGeom>
+          <a:noFill/>
+        </p:spPr>
+        <p:txBody>
+          <a:bodyPr wrap="square" lIns="0" tIns="0" rIns="0" bIns="0" rtlCol="0">
+            <a:spAutoFit/>
+          </a:bodyPr>
+          <a:lstStyle>
+            <a:defPPr>
+              <a:defRPr lang="en-US"/>
+            </a:defPPr>
+            <a:lvl1pPr algn="r">
+              <a:defRPr sz="1400">
+                <a:solidFill>
+                  <a:srgbClr val="0070C0"/>
+                </a:solidFill>
+              </a:defRPr>
+            </a:lvl1pPr>
+          </a:lstStyle>
+          <a:p>
+            <a:r>
+              <a:rPr lang="en-US" sz="1200" dirty="0" err="1"/>
+              <a:t>switchToRecordContext</a:t>
+            </a:r>
+            <a:r>
+              <a:rPr lang="en-US" sz="1200" dirty="0"/>
+              <a:t>()</a:t>
+            </a:r>
+          </a:p>
+        </p:txBody>
+      </p:sp>
+      <p:cxnSp>
+        <p:nvCxnSpPr>
+          <p:cNvPr id="92" name="Straight Arrow Connector 91">
+            <a:extLst>
+              <a:ext uri="{FF2B5EF4-FFF2-40B4-BE49-F238E27FC236}">
+                <a16:creationId xmlns:a16="http://schemas.microsoft.com/office/drawing/2014/main" id="{CDDD7CB4-CBC3-4539-90B6-8AC5882CD477}"/>
+              </a:ext>
+            </a:extLst>
+          </p:cNvPr>
+          <p:cNvCxnSpPr>
+            <a:cxnSpLocks/>
+          </p:cNvCxnSpPr>
+          <p:nvPr/>
+        </p:nvCxnSpPr>
+        <p:spPr>
+          <a:xfrm>
+            <a:off x="7202937" y="4919988"/>
+            <a:ext cx="1755261" cy="10166"/>
+          </a:xfrm>
+          <a:prstGeom prst="straightConnector1">
+            <a:avLst/>
+          </a:prstGeom>
+          <a:ln w="19050">
+            <a:solidFill>
+              <a:srgbClr val="0070C0"/>
+            </a:solidFill>
+            <a:tailEnd type="arrow"/>
+          </a:ln>
+        </p:spPr>
+        <p:style>
+          <a:lnRef idx="1">
+            <a:schemeClr val="accent1"/>
+          </a:lnRef>
+          <a:fillRef idx="0">
+            <a:schemeClr val="accent1"/>
+          </a:fillRef>
+          <a:effectRef idx="0">
+            <a:schemeClr val="accent1"/>
+          </a:effectRef>
+          <a:fontRef idx="minor">
+            <a:schemeClr val="tx1"/>
+          </a:fontRef>
+        </p:style>
+      </p:cxnSp>
     </p:spTree>
     <p:extLst>
       <p:ext uri="{BB962C8B-B14F-4D97-AF65-F5344CB8AC3E}">

</xml_diff>